<commit_message>
remove deparser in figure
</commit_message>
<xml_diff>
--- a/graph/graph.pptx
+++ b/graph/graph.pptx
@@ -200,7 +200,7 @@
           <a:p>
             <a:fld id="{83D1E673-CA6D-B044-BFDA-D4F4C1D0E2D0}" type="datetimeFigureOut">
               <a:rPr lang="en-US" smtClean="0"/>
-              <a:t>10/26/18</a:t>
+              <a:t>11/5/18</a:t>
             </a:fld>
             <a:endParaRPr lang="en-US"/>
           </a:p>
@@ -680,7 +680,7 @@
           <a:p>
             <a:fld id="{EE1DBB6F-DAED-FE4B-A210-17C78E93EBE3}" type="datetimeFigureOut">
               <a:rPr lang="en-US" smtClean="0"/>
-              <a:t>10/26/18</a:t>
+              <a:t>11/5/18</a:t>
             </a:fld>
             <a:endParaRPr lang="en-US"/>
           </a:p>
@@ -848,7 +848,7 @@
           <a:p>
             <a:fld id="{EE1DBB6F-DAED-FE4B-A210-17C78E93EBE3}" type="datetimeFigureOut">
               <a:rPr lang="en-US" smtClean="0"/>
-              <a:t>10/26/18</a:t>
+              <a:t>11/5/18</a:t>
             </a:fld>
             <a:endParaRPr lang="en-US"/>
           </a:p>
@@ -1026,7 +1026,7 @@
           <a:p>
             <a:fld id="{EE1DBB6F-DAED-FE4B-A210-17C78E93EBE3}" type="datetimeFigureOut">
               <a:rPr lang="en-US" smtClean="0"/>
-              <a:t>10/26/18</a:t>
+              <a:t>11/5/18</a:t>
             </a:fld>
             <a:endParaRPr lang="en-US"/>
           </a:p>
@@ -1194,7 +1194,7 @@
           <a:p>
             <a:fld id="{EE1DBB6F-DAED-FE4B-A210-17C78E93EBE3}" type="datetimeFigureOut">
               <a:rPr lang="en-US" smtClean="0"/>
-              <a:t>10/26/18</a:t>
+              <a:t>11/5/18</a:t>
             </a:fld>
             <a:endParaRPr lang="en-US"/>
           </a:p>
@@ -1439,7 +1439,7 @@
           <a:p>
             <a:fld id="{EE1DBB6F-DAED-FE4B-A210-17C78E93EBE3}" type="datetimeFigureOut">
               <a:rPr lang="en-US" smtClean="0"/>
-              <a:t>10/26/18</a:t>
+              <a:t>11/5/18</a:t>
             </a:fld>
             <a:endParaRPr lang="en-US"/>
           </a:p>
@@ -1668,7 +1668,7 @@
           <a:p>
             <a:fld id="{EE1DBB6F-DAED-FE4B-A210-17C78E93EBE3}" type="datetimeFigureOut">
               <a:rPr lang="en-US" smtClean="0"/>
-              <a:t>10/26/18</a:t>
+              <a:t>11/5/18</a:t>
             </a:fld>
             <a:endParaRPr lang="en-US"/>
           </a:p>
@@ -2032,7 +2032,7 @@
           <a:p>
             <a:fld id="{EE1DBB6F-DAED-FE4B-A210-17C78E93EBE3}" type="datetimeFigureOut">
               <a:rPr lang="en-US" smtClean="0"/>
-              <a:t>10/26/18</a:t>
+              <a:t>11/5/18</a:t>
             </a:fld>
             <a:endParaRPr lang="en-US"/>
           </a:p>
@@ -2149,7 +2149,7 @@
           <a:p>
             <a:fld id="{EE1DBB6F-DAED-FE4B-A210-17C78E93EBE3}" type="datetimeFigureOut">
               <a:rPr lang="en-US" smtClean="0"/>
-              <a:t>10/26/18</a:t>
+              <a:t>11/5/18</a:t>
             </a:fld>
             <a:endParaRPr lang="en-US"/>
           </a:p>
@@ -2244,7 +2244,7 @@
           <a:p>
             <a:fld id="{EE1DBB6F-DAED-FE4B-A210-17C78E93EBE3}" type="datetimeFigureOut">
               <a:rPr lang="en-US" smtClean="0"/>
-              <a:t>10/26/18</a:t>
+              <a:t>11/5/18</a:t>
             </a:fld>
             <a:endParaRPr lang="en-US"/>
           </a:p>
@@ -2519,7 +2519,7 @@
           <a:p>
             <a:fld id="{EE1DBB6F-DAED-FE4B-A210-17C78E93EBE3}" type="datetimeFigureOut">
               <a:rPr lang="en-US" smtClean="0"/>
-              <a:t>10/26/18</a:t>
+              <a:t>11/5/18</a:t>
             </a:fld>
             <a:endParaRPr lang="en-US"/>
           </a:p>
@@ -2771,7 +2771,7 @@
           <a:p>
             <a:fld id="{EE1DBB6F-DAED-FE4B-A210-17C78E93EBE3}" type="datetimeFigureOut">
               <a:rPr lang="en-US" smtClean="0"/>
-              <a:t>10/26/18</a:t>
+              <a:t>11/5/18</a:t>
             </a:fld>
             <a:endParaRPr lang="en-US"/>
           </a:p>
@@ -2982,7 +2982,7 @@
           <a:p>
             <a:fld id="{EE1DBB6F-DAED-FE4B-A210-17C78E93EBE3}" type="datetimeFigureOut">
               <a:rPr lang="en-US" smtClean="0"/>
-              <a:t>10/26/18</a:t>
+              <a:t>11/5/18</a:t>
             </a:fld>
             <a:endParaRPr lang="en-US"/>
           </a:p>
@@ -3404,7 +3404,7 @@
           <a:p>
             <a:r>
               <a:rPr lang="en-US" dirty="0"/>
-              <a:t>Radio 2017</a:t>
+              <a:t>LPC 2018</a:t>
             </a:r>
           </a:p>
         </p:txBody>
@@ -5899,66 +5899,6 @@
       </p:sp>
       <p:sp>
         <p:nvSpPr>
-          <p:cNvPr id="22" name="Rectangle 21"/>
-          <p:cNvSpPr/>
-          <p:nvPr/>
-        </p:nvSpPr>
-        <p:spPr>
-          <a:xfrm>
-            <a:off x="9537255" y="4023602"/>
-            <a:ext cx="1045662" cy="660803"/>
-          </a:xfrm>
-          <a:prstGeom prst="rect">
-            <a:avLst/>
-          </a:prstGeom>
-          <a:noFill/>
-          <a:ln w="25400">
-            <a:solidFill>
-              <a:schemeClr val="bg2">
-                <a:lumMod val="25000"/>
-              </a:schemeClr>
-            </a:solidFill>
-          </a:ln>
-        </p:spPr>
-        <p:style>
-          <a:lnRef idx="2">
-            <a:schemeClr val="accent1">
-              <a:shade val="50000"/>
-            </a:schemeClr>
-          </a:lnRef>
-          <a:fillRef idx="1">
-            <a:schemeClr val="accent1"/>
-          </a:fillRef>
-          <a:effectRef idx="0">
-            <a:schemeClr val="accent1"/>
-          </a:effectRef>
-          <a:fontRef idx="minor">
-            <a:schemeClr val="lt1"/>
-          </a:fontRef>
-        </p:style>
-        <p:txBody>
-          <a:bodyPr rtlCol="0" anchor="ctr"/>
-          <a:lstStyle/>
-          <a:p>
-            <a:pPr algn="ctr"/>
-            <a:r>
-              <a:rPr lang="en-US" dirty="0" err="1">
-                <a:solidFill>
-                  <a:schemeClr val="tx1"/>
-                </a:solidFill>
-              </a:rPr>
-              <a:t>Deparser</a:t>
-            </a:r>
-            <a:endParaRPr lang="en-US" dirty="0">
-              <a:solidFill>
-                <a:schemeClr val="tx1"/>
-              </a:solidFill>
-            </a:endParaRPr>
-          </a:p>
-        </p:txBody>
-      </p:sp>
-      <p:sp>
-        <p:nvSpPr>
           <p:cNvPr id="23" name="Rectangle 22"/>
           <p:cNvSpPr/>
           <p:nvPr/>
@@ -6566,41 +6506,6 @@
       </p:cxnSp>
       <p:cxnSp>
         <p:nvCxnSpPr>
-          <p:cNvPr id="85" name="Straight Arrow Connector 84"/>
-          <p:cNvCxnSpPr>
-            <a:stCxn id="22" idx="3"/>
-          </p:cNvCxnSpPr>
-          <p:nvPr/>
-        </p:nvCxnSpPr>
-        <p:spPr>
-          <a:xfrm flipV="1">
-            <a:off x="10582917" y="4354003"/>
-            <a:ext cx="327253" cy="1"/>
-          </a:xfrm>
-          <a:prstGeom prst="straightConnector1">
-            <a:avLst/>
-          </a:prstGeom>
-          <a:ln>
-            <a:tailEnd type="triangle"/>
-          </a:ln>
-        </p:spPr>
-        <p:style>
-          <a:lnRef idx="1">
-            <a:schemeClr val="accent1"/>
-          </a:lnRef>
-          <a:fillRef idx="0">
-            <a:schemeClr val="accent1"/>
-          </a:fillRef>
-          <a:effectRef idx="0">
-            <a:schemeClr val="accent1"/>
-          </a:effectRef>
-          <a:fontRef idx="minor">
-            <a:schemeClr val="tx1"/>
-          </a:fontRef>
-        </p:style>
-      </p:cxnSp>
-      <p:cxnSp>
-        <p:nvCxnSpPr>
           <p:cNvPr id="89" name="Straight Connector 88"/>
           <p:cNvCxnSpPr/>
           <p:nvPr/>
@@ -7221,123 +7126,6 @@
               <a:rPr lang="en-US" sz="1500" dirty="0"/>
               <a:t>BPF Map</a:t>
             </a:r>
-          </a:p>
-        </p:txBody>
-      </p:sp>
-      <p:sp>
-        <p:nvSpPr>
-          <p:cNvPr id="17" name="TextBox 16"/>
-          <p:cNvSpPr txBox="1"/>
-          <p:nvPr/>
-        </p:nvSpPr>
-        <p:spPr>
-          <a:xfrm>
-            <a:off x="9377172" y="3434434"/>
-            <a:ext cx="812851" cy="292388"/>
-          </a:xfrm>
-          <a:prstGeom prst="rect">
-            <a:avLst/>
-          </a:prstGeom>
-          <a:noFill/>
-        </p:spPr>
-        <p:txBody>
-          <a:bodyPr wrap="none" rtlCol="0">
-            <a:spAutoFit/>
-          </a:bodyPr>
-          <a:lstStyle/>
-          <a:p>
-            <a:r>
-              <a:rPr lang="en-US" sz="1300" dirty="0"/>
-              <a:t>Short-cut</a:t>
-            </a:r>
-          </a:p>
-        </p:txBody>
-      </p:sp>
-      <p:sp>
-        <p:nvSpPr>
-          <p:cNvPr id="24" name="Freeform 23"/>
-          <p:cNvSpPr/>
-          <p:nvPr/>
-        </p:nvSpPr>
-        <p:spPr>
-          <a:xfrm>
-            <a:off x="9008533" y="3640636"/>
-            <a:ext cx="694267" cy="389497"/>
-          </a:xfrm>
-          <a:custGeom>
-            <a:avLst/>
-            <a:gdLst>
-              <a:gd name="connsiteX0" fmla="*/ 0 w 694267"/>
-              <a:gd name="connsiteY0" fmla="*/ 372564 h 389497"/>
-              <a:gd name="connsiteX1" fmla="*/ 338667 w 694267"/>
-              <a:gd name="connsiteY1" fmla="*/ 31 h 389497"/>
-              <a:gd name="connsiteX2" fmla="*/ 694267 w 694267"/>
-              <a:gd name="connsiteY2" fmla="*/ 389497 h 389497"/>
-            </a:gdLst>
-            <a:ahLst/>
-            <a:cxnLst>
-              <a:cxn ang="0">
-                <a:pos x="connsiteX0" y="connsiteY0"/>
-              </a:cxn>
-              <a:cxn ang="0">
-                <a:pos x="connsiteX1" y="connsiteY1"/>
-              </a:cxn>
-              <a:cxn ang="0">
-                <a:pos x="connsiteX2" y="connsiteY2"/>
-              </a:cxn>
-            </a:cxnLst>
-            <a:rect l="l" t="t" r="r" b="b"/>
-            <a:pathLst>
-              <a:path w="694267" h="389497">
-                <a:moveTo>
-                  <a:pt x="0" y="372564"/>
-                </a:moveTo>
-                <a:cubicBezTo>
-                  <a:pt x="111478" y="184886"/>
-                  <a:pt x="222956" y="-2791"/>
-                  <a:pt x="338667" y="31"/>
-                </a:cubicBezTo>
-                <a:cubicBezTo>
-                  <a:pt x="454378" y="2853"/>
-                  <a:pt x="694267" y="389497"/>
-                  <a:pt x="694267" y="389497"/>
-                </a:cubicBezTo>
-              </a:path>
-            </a:pathLst>
-          </a:custGeom>
-          <a:noFill/>
-          <a:ln w="38100" cmpd="dbl">
-            <a:solidFill>
-              <a:schemeClr val="accent1">
-                <a:lumMod val="60000"/>
-                <a:lumOff val="40000"/>
-              </a:schemeClr>
-            </a:solidFill>
-            <a:tailEnd type="triangle"/>
-          </a:ln>
-        </p:spPr>
-        <p:style>
-          <a:lnRef idx="2">
-            <a:schemeClr val="accent1">
-              <a:shade val="50000"/>
-            </a:schemeClr>
-          </a:lnRef>
-          <a:fillRef idx="1">
-            <a:schemeClr val="accent1"/>
-          </a:fillRef>
-          <a:effectRef idx="0">
-            <a:schemeClr val="accent1"/>
-          </a:effectRef>
-          <a:fontRef idx="minor">
-            <a:schemeClr val="lt1"/>
-          </a:fontRef>
-        </p:style>
-        <p:txBody>
-          <a:bodyPr rtlCol="0" anchor="ctr"/>
-          <a:lstStyle/>
-          <a:p>
-            <a:pPr algn="ctr"/>
-            <a:endParaRPr lang="en-US"/>
           </a:p>
         </p:txBody>
       </p:sp>

</xml_diff>